<commit_message>
Bringing things up to date.
</commit_message>
<xml_diff>
--- a/Slides/Test Code Coverage.pptx
+++ b/Slides/Test Code Coverage.pptx
@@ -3587,7 +3587,10 @@
           <a:bodyPr/>
           <a:lstStyle/>
           <a:p>
-            <a:endParaRPr lang="en-US"/>
+            <a:r>
+              <a:rPr lang="en-US" dirty="0"/>
+              <a:t>The Rails Way</a:t>
+            </a:r>
           </a:p>
         </p:txBody>
       </p:sp>
@@ -4167,7 +4170,7 @@
             </a:r>
             <a:r>
               <a:rPr lang="en-US" sz="4400" dirty="0" err="1"/>
-              <a:t>est_helper.Rb</a:t>
+              <a:t>test_helper.Rb</a:t>
             </a:r>
             <a:r>
               <a:rPr lang="en-US" sz="4400" dirty="0"/>
@@ -4484,6 +4487,7 @@
           <a:bodyPr/>
           <a:lstStyle/>
           <a:p>
+            <a:pPr algn="just"/>
             <a:r>
               <a:rPr lang="en-US" dirty="0"/>
               <a:t>Open</a:t>

</xml_diff>